<commit_message>
updated slides w/ process diagram
</commit_message>
<xml_diff>
--- a/grid-incubation/incubator/projects/i2b2DataServiceStyle/slides/i2b2 – caGrid Data Services.pptx
+++ b/grid-incubation/incubator/projects/i2b2DataServiceStyle/slides/i2b2 – caGrid Data Services.pptx
@@ -6,6 +6,8 @@
   </p:sldMasterIdLst>
   <p:sldIdLst>
     <p:sldId id="257" r:id="rId2"/>
+    <p:sldId id="258" r:id="rId3"/>
+    <p:sldId id="259" r:id="rId4"/>
   </p:sldIdLst>
   <p:sldSz cx="9144000" cy="6858000" type="screen4x3"/>
   <p:notesSz cx="6858000" cy="9144000"/>
@@ -288,7 +290,8 @@
           <a:p>
             <a:fld id="{B5D84D63-6442-48F6-8D37-D6D0E5AF2F44}" type="datetimeFigureOut">
               <a:rPr lang="en-US" smtClean="0"/>
-              <a:t>7/9/2009</a:t>
+              <a:pPr/>
+              <a:t>7/30/2009</a:t>
             </a:fld>
             <a:endParaRPr lang="en-US"/>
           </a:p>
@@ -330,6 +333,7 @@
           <a:p>
             <a:fld id="{752F2629-0038-40D8-A8DF-C4779795BEC1}" type="slidenum">
               <a:rPr lang="en-US" smtClean="0"/>
+              <a:pPr/>
               <a:t>‹#›</a:t>
             </a:fld>
             <a:endParaRPr lang="en-US"/>
@@ -453,7 +457,8 @@
           <a:p>
             <a:fld id="{B5D84D63-6442-48F6-8D37-D6D0E5AF2F44}" type="datetimeFigureOut">
               <a:rPr lang="en-US" smtClean="0"/>
-              <a:t>7/9/2009</a:t>
+              <a:pPr/>
+              <a:t>7/30/2009</a:t>
             </a:fld>
             <a:endParaRPr lang="en-US"/>
           </a:p>
@@ -495,6 +500,7 @@
           <a:p>
             <a:fld id="{752F2629-0038-40D8-A8DF-C4779795BEC1}" type="slidenum">
               <a:rPr lang="en-US" smtClean="0"/>
+              <a:pPr/>
               <a:t>‹#›</a:t>
             </a:fld>
             <a:endParaRPr lang="en-US"/>
@@ -628,7 +634,8 @@
           <a:p>
             <a:fld id="{B5D84D63-6442-48F6-8D37-D6D0E5AF2F44}" type="datetimeFigureOut">
               <a:rPr lang="en-US" smtClean="0"/>
-              <a:t>7/9/2009</a:t>
+              <a:pPr/>
+              <a:t>7/30/2009</a:t>
             </a:fld>
             <a:endParaRPr lang="en-US"/>
           </a:p>
@@ -670,6 +677,7 @@
           <a:p>
             <a:fld id="{752F2629-0038-40D8-A8DF-C4779795BEC1}" type="slidenum">
               <a:rPr lang="en-US" smtClean="0"/>
+              <a:pPr/>
               <a:t>‹#›</a:t>
             </a:fld>
             <a:endParaRPr lang="en-US"/>
@@ -793,7 +801,8 @@
           <a:p>
             <a:fld id="{B5D84D63-6442-48F6-8D37-D6D0E5AF2F44}" type="datetimeFigureOut">
               <a:rPr lang="en-US" smtClean="0"/>
-              <a:t>7/9/2009</a:t>
+              <a:pPr/>
+              <a:t>7/30/2009</a:t>
             </a:fld>
             <a:endParaRPr lang="en-US"/>
           </a:p>
@@ -835,6 +844,7 @@
           <a:p>
             <a:fld id="{752F2629-0038-40D8-A8DF-C4779795BEC1}" type="slidenum">
               <a:rPr lang="en-US" smtClean="0"/>
+              <a:pPr/>
               <a:t>‹#›</a:t>
             </a:fld>
             <a:endParaRPr lang="en-US"/>
@@ -1034,7 +1044,8 @@
           <a:p>
             <a:fld id="{B5D84D63-6442-48F6-8D37-D6D0E5AF2F44}" type="datetimeFigureOut">
               <a:rPr lang="en-US" smtClean="0"/>
-              <a:t>7/9/2009</a:t>
+              <a:pPr/>
+              <a:t>7/30/2009</a:t>
             </a:fld>
             <a:endParaRPr lang="en-US"/>
           </a:p>
@@ -1076,6 +1087,7 @@
           <a:p>
             <a:fld id="{752F2629-0038-40D8-A8DF-C4779795BEC1}" type="slidenum">
               <a:rPr lang="en-US" smtClean="0"/>
+              <a:pPr/>
               <a:t>‹#›</a:t>
             </a:fld>
             <a:endParaRPr lang="en-US"/>
@@ -1317,7 +1329,8 @@
           <a:p>
             <a:fld id="{B5D84D63-6442-48F6-8D37-D6D0E5AF2F44}" type="datetimeFigureOut">
               <a:rPr lang="en-US" smtClean="0"/>
-              <a:t>7/9/2009</a:t>
+              <a:pPr/>
+              <a:t>7/30/2009</a:t>
             </a:fld>
             <a:endParaRPr lang="en-US"/>
           </a:p>
@@ -1359,6 +1372,7 @@
           <a:p>
             <a:fld id="{752F2629-0038-40D8-A8DF-C4779795BEC1}" type="slidenum">
               <a:rPr lang="en-US" smtClean="0"/>
+              <a:pPr/>
               <a:t>‹#›</a:t>
             </a:fld>
             <a:endParaRPr lang="en-US"/>
@@ -1734,7 +1748,8 @@
           <a:p>
             <a:fld id="{B5D84D63-6442-48F6-8D37-D6D0E5AF2F44}" type="datetimeFigureOut">
               <a:rPr lang="en-US" smtClean="0"/>
-              <a:t>7/9/2009</a:t>
+              <a:pPr/>
+              <a:t>7/30/2009</a:t>
             </a:fld>
             <a:endParaRPr lang="en-US"/>
           </a:p>
@@ -1776,6 +1791,7 @@
           <a:p>
             <a:fld id="{752F2629-0038-40D8-A8DF-C4779795BEC1}" type="slidenum">
               <a:rPr lang="en-US" smtClean="0"/>
+              <a:pPr/>
               <a:t>‹#›</a:t>
             </a:fld>
             <a:endParaRPr lang="en-US"/>
@@ -1847,7 +1863,8 @@
           <a:p>
             <a:fld id="{B5D84D63-6442-48F6-8D37-D6D0E5AF2F44}" type="datetimeFigureOut">
               <a:rPr lang="en-US" smtClean="0"/>
-              <a:t>7/9/2009</a:t>
+              <a:pPr/>
+              <a:t>7/30/2009</a:t>
             </a:fld>
             <a:endParaRPr lang="en-US"/>
           </a:p>
@@ -1889,6 +1906,7 @@
           <a:p>
             <a:fld id="{752F2629-0038-40D8-A8DF-C4779795BEC1}" type="slidenum">
               <a:rPr lang="en-US" smtClean="0"/>
+              <a:pPr/>
               <a:t>‹#›</a:t>
             </a:fld>
             <a:endParaRPr lang="en-US"/>
@@ -1937,7 +1955,8 @@
           <a:p>
             <a:fld id="{B5D84D63-6442-48F6-8D37-D6D0E5AF2F44}" type="datetimeFigureOut">
               <a:rPr lang="en-US" smtClean="0"/>
-              <a:t>7/9/2009</a:t>
+              <a:pPr/>
+              <a:t>7/30/2009</a:t>
             </a:fld>
             <a:endParaRPr lang="en-US"/>
           </a:p>
@@ -1979,6 +1998,7 @@
           <a:p>
             <a:fld id="{752F2629-0038-40D8-A8DF-C4779795BEC1}" type="slidenum">
               <a:rPr lang="en-US" smtClean="0"/>
+              <a:pPr/>
               <a:t>‹#›</a:t>
             </a:fld>
             <a:endParaRPr lang="en-US"/>
@@ -2209,7 +2229,8 @@
           <a:p>
             <a:fld id="{B5D84D63-6442-48F6-8D37-D6D0E5AF2F44}" type="datetimeFigureOut">
               <a:rPr lang="en-US" smtClean="0"/>
-              <a:t>7/9/2009</a:t>
+              <a:pPr/>
+              <a:t>7/30/2009</a:t>
             </a:fld>
             <a:endParaRPr lang="en-US"/>
           </a:p>
@@ -2251,6 +2272,7 @@
           <a:p>
             <a:fld id="{752F2629-0038-40D8-A8DF-C4779795BEC1}" type="slidenum">
               <a:rPr lang="en-US" smtClean="0"/>
+              <a:pPr/>
               <a:t>‹#›</a:t>
             </a:fld>
             <a:endParaRPr lang="en-US"/>
@@ -2457,7 +2479,8 @@
           <a:p>
             <a:fld id="{B5D84D63-6442-48F6-8D37-D6D0E5AF2F44}" type="datetimeFigureOut">
               <a:rPr lang="en-US" smtClean="0"/>
-              <a:t>7/9/2009</a:t>
+              <a:pPr/>
+              <a:t>7/30/2009</a:t>
             </a:fld>
             <a:endParaRPr lang="en-US"/>
           </a:p>
@@ -2499,6 +2522,7 @@
           <a:p>
             <a:fld id="{752F2629-0038-40D8-A8DF-C4779795BEC1}" type="slidenum">
               <a:rPr lang="en-US" smtClean="0"/>
+              <a:pPr/>
               <a:t>‹#›</a:t>
             </a:fld>
             <a:endParaRPr lang="en-US"/>
@@ -2665,7 +2689,8 @@
           <a:p>
             <a:fld id="{B5D84D63-6442-48F6-8D37-D6D0E5AF2F44}" type="datetimeFigureOut">
               <a:rPr lang="en-US" smtClean="0"/>
-              <a:t>7/9/2009</a:t>
+              <a:pPr/>
+              <a:t>7/30/2009</a:t>
             </a:fld>
             <a:endParaRPr lang="en-US"/>
           </a:p>
@@ -2743,6 +2768,7 @@
           <a:p>
             <a:fld id="{752F2629-0038-40D8-A8DF-C4779795BEC1}" type="slidenum">
               <a:rPr lang="en-US" smtClean="0"/>
+              <a:pPr/>
               <a:t>‹#›</a:t>
             </a:fld>
             <a:endParaRPr lang="en-US"/>
@@ -3164,6 +3190,226 @@
               <a:t>Ensures transparent interoperability with existing tooling (FQP, standard data service clients, etc).</a:t>
             </a:r>
             <a:endParaRPr lang="en-US" sz="1600" dirty="0"/>
+          </a:p>
+        </p:txBody>
+      </p:sp>
+    </p:spTree>
+  </p:cSld>
+  <p:clrMapOvr>
+    <a:masterClrMapping/>
+  </p:clrMapOvr>
+</p:sld>
+</file>
+
+<file path=ppt/slides/slide2.xml><?xml version="1.0" encoding="utf-8"?>
+<p:sld xmlns:a="http://schemas.openxmlformats.org/drawingml/2006/main" xmlns:r="http://schemas.openxmlformats.org/officeDocument/2006/relationships" xmlns:p="http://schemas.openxmlformats.org/presentationml/2006/main">
+  <p:cSld>
+    <p:spTree>
+      <p:nvGrpSpPr>
+        <p:cNvPr id="1" name=""/>
+        <p:cNvGrpSpPr/>
+        <p:nvPr/>
+      </p:nvGrpSpPr>
+      <p:grpSpPr>
+        <a:xfrm>
+          <a:off x="0" y="0"/>
+          <a:ext cx="0" cy="0"/>
+          <a:chOff x="0" y="0"/>
+          <a:chExt cx="0" cy="0"/>
+        </a:xfrm>
+      </p:grpSpPr>
+      <p:sp>
+        <p:nvSpPr>
+          <p:cNvPr id="2" name="Title 1"/>
+          <p:cNvSpPr>
+            <a:spLocks noGrp="1"/>
+          </p:cNvSpPr>
+          <p:nvPr>
+            <p:ph type="title"/>
+          </p:nvPr>
+        </p:nvSpPr>
+        <p:spPr/>
+        <p:txBody>
+          <a:bodyPr/>
+          <a:lstStyle/>
+          <a:p>
+            <a:r>
+              <a:rPr lang="en-US" dirty="0" smtClean="0"/>
+              <a:t>I2b2 – caGrid Data Services</a:t>
+            </a:r>
+            <a:endParaRPr lang="en-US" dirty="0"/>
+          </a:p>
+        </p:txBody>
+      </p:sp>
+      <p:pic>
+        <p:nvPicPr>
+          <p:cNvPr id="1027" name="Picture 3"/>
+          <p:cNvPicPr>
+            <a:picLocks noChangeAspect="1" noChangeArrowheads="1"/>
+          </p:cNvPicPr>
+          <p:nvPr/>
+        </p:nvPicPr>
+        <p:blipFill>
+          <a:blip r:embed="rId2" cstate="print"/>
+          <a:srcRect/>
+          <a:stretch>
+            <a:fillRect/>
+          </a:stretch>
+        </p:blipFill>
+        <p:spPr bwMode="auto">
+          <a:xfrm>
+            <a:off x="1828800" y="1066800"/>
+            <a:ext cx="5610225" cy="5684260"/>
+          </a:xfrm>
+          <a:prstGeom prst="rect">
+            <a:avLst/>
+          </a:prstGeom>
+          <a:noFill/>
+          <a:ln w="9525">
+            <a:noFill/>
+            <a:miter lim="800000"/>
+            <a:headEnd/>
+            <a:tailEnd/>
+          </a:ln>
+        </p:spPr>
+      </p:pic>
+    </p:spTree>
+  </p:cSld>
+  <p:clrMapOvr>
+    <a:masterClrMapping/>
+  </p:clrMapOvr>
+</p:sld>
+</file>
+
+<file path=ppt/slides/slide3.xml><?xml version="1.0" encoding="utf-8"?>
+<p:sld xmlns:a="http://schemas.openxmlformats.org/drawingml/2006/main" xmlns:r="http://schemas.openxmlformats.org/officeDocument/2006/relationships" xmlns:p="http://schemas.openxmlformats.org/presentationml/2006/main">
+  <p:cSld>
+    <p:spTree>
+      <p:nvGrpSpPr>
+        <p:cNvPr id="1" name=""/>
+        <p:cNvGrpSpPr/>
+        <p:nvPr/>
+      </p:nvGrpSpPr>
+      <p:grpSpPr>
+        <a:xfrm>
+          <a:off x="0" y="0"/>
+          <a:ext cx="0" cy="0"/>
+          <a:chOff x="0" y="0"/>
+          <a:chExt cx="0" cy="0"/>
+        </a:xfrm>
+      </p:grpSpPr>
+      <p:sp>
+        <p:nvSpPr>
+          <p:cNvPr id="2" name="Title 1"/>
+          <p:cNvSpPr>
+            <a:spLocks noGrp="1"/>
+          </p:cNvSpPr>
+          <p:nvPr>
+            <p:ph type="title"/>
+          </p:nvPr>
+        </p:nvSpPr>
+        <p:spPr/>
+        <p:txBody>
+          <a:bodyPr/>
+          <a:lstStyle/>
+          <a:p>
+            <a:r>
+              <a:rPr lang="en-US" dirty="0" smtClean="0"/>
+              <a:t>i2b2 – caGrid Data Services</a:t>
+            </a:r>
+            <a:endParaRPr lang="en-US" dirty="0"/>
+          </a:p>
+        </p:txBody>
+      </p:sp>
+      <p:sp>
+        <p:nvSpPr>
+          <p:cNvPr id="3" name="Content Placeholder 2"/>
+          <p:cNvSpPr>
+            <a:spLocks noGrp="1"/>
+          </p:cNvSpPr>
+          <p:nvPr>
+            <p:ph idx="1"/>
+          </p:nvPr>
+        </p:nvSpPr>
+        <p:spPr>
+          <a:xfrm>
+            <a:off x="457200" y="1600200"/>
+            <a:ext cx="8229600" cy="5181600"/>
+          </a:xfrm>
+        </p:spPr>
+        <p:txBody>
+          <a:bodyPr>
+            <a:normAutofit/>
+          </a:bodyPr>
+          <a:lstStyle/>
+          <a:p>
+            <a:r>
+              <a:rPr lang="en-US" sz="2400" dirty="0" err="1" smtClean="0"/>
+              <a:t>OntoMapper</a:t>
+            </a:r>
+            <a:r>
+              <a:rPr lang="en-US" sz="2400" dirty="0" smtClean="0"/>
+              <a:t> used to annotate data model and i2b2 database with CDEs</a:t>
+            </a:r>
+          </a:p>
+          <a:p>
+            <a:pPr lvl="1"/>
+            <a:r>
+              <a:rPr lang="en-US" sz="2000" dirty="0" smtClean="0"/>
+              <a:t>CDEs derived from </a:t>
+            </a:r>
+            <a:r>
+              <a:rPr lang="en-US" sz="2000" dirty="0" err="1" smtClean="0"/>
+              <a:t>caDSR</a:t>
+            </a:r>
+            <a:r>
+              <a:rPr lang="en-US" sz="2000" dirty="0" smtClean="0"/>
+              <a:t> or </a:t>
+            </a:r>
+            <a:r>
+              <a:rPr lang="en-US" sz="2000" dirty="0" err="1" smtClean="0"/>
+              <a:t>OpenMDR</a:t>
+            </a:r>
+            <a:endParaRPr lang="en-US" sz="2000" dirty="0" smtClean="0"/>
+          </a:p>
+          <a:p>
+            <a:r>
+              <a:rPr lang="en-US" sz="2400" dirty="0" smtClean="0"/>
+              <a:t>Introduce toolkit with i2b2 Data Service creation wizard generates a caGrid Data Service</a:t>
+            </a:r>
+          </a:p>
+          <a:p>
+            <a:pPr lvl="1"/>
+            <a:r>
+              <a:rPr lang="en-US" sz="2000" dirty="0" smtClean="0"/>
+              <a:t>Developer specifies annotated XMI data model</a:t>
+            </a:r>
+          </a:p>
+          <a:p>
+            <a:r>
+              <a:rPr lang="en-US" sz="2400" dirty="0" smtClean="0"/>
+              <a:t>Data Service invokes i2b2 CQL Query Processor in response to CQL queries</a:t>
+            </a:r>
+          </a:p>
+          <a:p>
+            <a:pPr lvl="1"/>
+            <a:r>
+              <a:rPr lang="en-US" sz="2000" dirty="0" smtClean="0"/>
+              <a:t>Query Processor locates CDEs for each class / attribute in the annotated XMI data model</a:t>
+            </a:r>
+          </a:p>
+          <a:p>
+            <a:pPr lvl="1"/>
+            <a:r>
+              <a:rPr lang="en-US" sz="2000" dirty="0" smtClean="0"/>
+              <a:t>CDEs used to discover i2b2 query paths</a:t>
+            </a:r>
+          </a:p>
+          <a:p>
+            <a:r>
+              <a:rPr lang="en-US" sz="2400" dirty="0" smtClean="0"/>
+              <a:t>Data is extracted from the i2b2 database and processed into CQL query results for the grid user</a:t>
+            </a:r>
           </a:p>
         </p:txBody>
       </p:sp>

</xml_diff>